<commit_message>
Modif des accents lors de la fin du Chrono et fin du manuel utilisateur THIS IS SPARTAAAAAAAAAAAAAAAAAAAAAAAAAAAAAAAAAAAAAAAAAA!!!!!!!!!!!!!!!!!!!!!!!
</commit_message>
<xml_diff>
--- a/Docs/manuel utilisateur WQ.pptx
+++ b/Docs/manuel utilisateur WQ.pptx
@@ -115,6 +115,22 @@
       </a:defRPr>
     </a:lvl9pPr>
   </p:defaultTextStyle>
+  <p:extLst>
+    <p:ext uri="{EFAFB233-063F-42B5-8137-9DF3F51BA10A}">
+      <p15:sldGuideLst xmlns:p15="http://schemas.microsoft.com/office/powerpoint/2012/main">
+        <p15:guide id="1" orient="horz" pos="2880">
+          <p15:clr>
+            <a:srgbClr val="A4A3A4"/>
+          </p15:clr>
+        </p15:guide>
+        <p15:guide id="2" pos="2160">
+          <p15:clr>
+            <a:srgbClr val="A4A3A4"/>
+          </p15:clr>
+        </p15:guide>
+      </p15:sldGuideLst>
+    </p:ext>
+  </p:extLst>
 </p:presentation>
 </file>
 
@@ -200,7 +216,7 @@
           <a:p>
             <a:fld id="{D46F5D7E-4940-462E-9A8F-F4473C2CBC40}" type="datetimeFigureOut">
               <a:rPr lang="fr-FR" smtClean="0"/>
-              <a:t>18/05/2014</a:t>
+              <a:t>19/05/2014</a:t>
             </a:fld>
             <a:endParaRPr lang="fr-FR"/>
           </a:p>
@@ -1224,7 +1240,7 @@
           <a:p>
             <a:fld id="{3129A72F-686B-4727-899E-1B6AF7604176}" type="datetimeFigureOut">
               <a:rPr lang="fr-FR" smtClean="0"/>
-              <a:t>18/05/2014</a:t>
+              <a:t>19/05/2014</a:t>
             </a:fld>
             <a:endParaRPr lang="fr-FR"/>
           </a:p>
@@ -1429,7 +1445,7 @@
           <a:p>
             <a:fld id="{3129A72F-686B-4727-899E-1B6AF7604176}" type="datetimeFigureOut">
               <a:rPr lang="fr-FR" smtClean="0"/>
-              <a:t>18/05/2014</a:t>
+              <a:t>19/05/2014</a:t>
             </a:fld>
             <a:endParaRPr lang="fr-FR"/>
           </a:p>
@@ -1644,7 +1660,7 @@
           <a:p>
             <a:fld id="{3129A72F-686B-4727-899E-1B6AF7604176}" type="datetimeFigureOut">
               <a:rPr lang="fr-FR" smtClean="0"/>
-              <a:t>18/05/2014</a:t>
+              <a:t>19/05/2014</a:t>
             </a:fld>
             <a:endParaRPr lang="fr-FR"/>
           </a:p>
@@ -1849,7 +1865,7 @@
           <a:p>
             <a:fld id="{3129A72F-686B-4727-899E-1B6AF7604176}" type="datetimeFigureOut">
               <a:rPr lang="fr-FR" smtClean="0"/>
-              <a:t>18/05/2014</a:t>
+              <a:t>19/05/2014</a:t>
             </a:fld>
             <a:endParaRPr lang="fr-FR"/>
           </a:p>
@@ -2119,7 +2135,7 @@
           <a:p>
             <a:fld id="{3129A72F-686B-4727-899E-1B6AF7604176}" type="datetimeFigureOut">
               <a:rPr lang="fr-FR" smtClean="0"/>
-              <a:t>18/05/2014</a:t>
+              <a:t>19/05/2014</a:t>
             </a:fld>
             <a:endParaRPr lang="fr-FR"/>
           </a:p>
@@ -2604,7 +2620,7 @@
           <a:p>
             <a:fld id="{3129A72F-686B-4727-899E-1B6AF7604176}" type="datetimeFigureOut">
               <a:rPr lang="fr-FR" smtClean="0"/>
-              <a:t>18/05/2014</a:t>
+              <a:t>19/05/2014</a:t>
             </a:fld>
             <a:endParaRPr lang="fr-FR"/>
           </a:p>
@@ -3072,7 +3088,7 @@
           <a:p>
             <a:fld id="{3129A72F-686B-4727-899E-1B6AF7604176}" type="datetimeFigureOut">
               <a:rPr lang="fr-FR" smtClean="0"/>
-              <a:t>18/05/2014</a:t>
+              <a:t>19/05/2014</a:t>
             </a:fld>
             <a:endParaRPr lang="fr-FR"/>
           </a:p>
@@ -3209,7 +3225,7 @@
           <a:p>
             <a:fld id="{3129A72F-686B-4727-899E-1B6AF7604176}" type="datetimeFigureOut">
               <a:rPr lang="fr-FR" smtClean="0"/>
-              <a:t>18/05/2014</a:t>
+              <a:t>19/05/2014</a:t>
             </a:fld>
             <a:endParaRPr lang="fr-FR"/>
           </a:p>
@@ -3323,7 +3339,7 @@
           <a:p>
             <a:fld id="{3129A72F-686B-4727-899E-1B6AF7604176}" type="datetimeFigureOut">
               <a:rPr lang="fr-FR" smtClean="0"/>
-              <a:t>18/05/2014</a:t>
+              <a:t>19/05/2014</a:t>
             </a:fld>
             <a:endParaRPr lang="fr-FR"/>
           </a:p>
@@ -3629,7 +3645,7 @@
           <a:p>
             <a:fld id="{3129A72F-686B-4727-899E-1B6AF7604176}" type="datetimeFigureOut">
               <a:rPr lang="fr-FR" smtClean="0"/>
-              <a:t>18/05/2014</a:t>
+              <a:t>19/05/2014</a:t>
             </a:fld>
             <a:endParaRPr lang="fr-FR"/>
           </a:p>
@@ -3924,7 +3940,7 @@
           <a:p>
             <a:fld id="{3129A72F-686B-4727-899E-1B6AF7604176}" type="datetimeFigureOut">
               <a:rPr lang="fr-FR" smtClean="0"/>
-              <a:t>18/05/2014</a:t>
+              <a:t>19/05/2014</a:t>
             </a:fld>
             <a:endParaRPr lang="fr-FR"/>
           </a:p>
@@ -4553,7 +4569,7 @@
           <a:p>
             <a:fld id="{3129A72F-686B-4727-899E-1B6AF7604176}" type="datetimeFigureOut">
               <a:rPr lang="fr-FR" smtClean="0"/>
-              <a:t>18/05/2014</a:t>
+              <a:t>19/05/2014</a:t>
             </a:fld>
             <a:endParaRPr lang="fr-FR"/>
           </a:p>
@@ -5685,8 +5701,8 @@
         </p:nvSpPr>
         <p:spPr bwMode="auto">
           <a:xfrm>
-            <a:off x="3645024" y="5580112"/>
-            <a:ext cx="3190920" cy="1754326"/>
+            <a:off x="3645024" y="5441613"/>
+            <a:ext cx="3190920" cy="2031325"/>
           </a:xfrm>
           <a:prstGeom prst="rect">
             <a:avLst/>
@@ -5832,79 +5848,23 @@
                 <a:ea typeface="Calibri" pitchFamily="34" charset="0"/>
                 <a:cs typeface="Times New Roman" pitchFamily="18" charset="0"/>
               </a:rPr>
-              <a:t> afin d’enregistrer votre compte.</a:t>
-            </a:r>
-            <a:endParaRPr kumimoji="0" lang="fr-FR" altLang="fr-FR" b="0" i="0" u="none" strike="noStrike" cap="none" normalizeH="0" baseline="0" dirty="0" smtClean="0">
-              <a:ln>
-                <a:noFill/>
-              </a:ln>
-              <a:solidFill>
-                <a:schemeClr val="tx1"/>
-              </a:solidFill>
-              <a:effectLst/>
-              <a:cs typeface="Arial" pitchFamily="34" charset="0"/>
-            </a:endParaRPr>
-          </a:p>
-        </p:txBody>
-      </p:sp>
-      <p:sp>
-        <p:nvSpPr>
-          <p:cNvPr id="11" name="Rectangle 5"/>
-          <p:cNvSpPr>
-            <a:spLocks noChangeArrowheads="1"/>
-          </p:cNvSpPr>
-          <p:nvPr/>
-        </p:nvSpPr>
-        <p:spPr bwMode="auto">
-          <a:xfrm>
-            <a:off x="3645024" y="7404119"/>
-            <a:ext cx="2910457" cy="1200329"/>
-          </a:xfrm>
-          <a:prstGeom prst="rect">
-            <a:avLst/>
-          </a:prstGeom>
-          <a:noFill/>
-          <a:ln>
-            <a:noFill/>
-          </a:ln>
-          <a:effectLst/>
-          <a:extLst>
-            <a:ext uri="{909E8E84-426E-40DD-AFC4-6F175D3DCCD1}">
-              <a14:hiddenFill xmlns:a14="http://schemas.microsoft.com/office/drawing/2010/main">
-                <a:solidFill>
-                  <a:schemeClr val="accent1"/>
-                </a:solidFill>
-              </a14:hiddenFill>
-            </a:ext>
-            <a:ext uri="{91240B29-F687-4F45-9708-019B960494DF}">
-              <a14:hiddenLine xmlns:a14="http://schemas.microsoft.com/office/drawing/2010/main" w="9525">
+              <a:t> afin d’enregistrer votre compte</a:t>
+            </a:r>
+            <a:r>
+              <a:rPr kumimoji="0" lang="fr-FR" altLang="fr-FR" b="0" i="0" u="none" strike="noStrike" cap="none" normalizeH="0" baseline="0" dirty="0" smtClean="0">
+                <a:ln>
+                  <a:noFill/>
+                </a:ln>
                 <a:solidFill>
                   <a:schemeClr val="tx1"/>
                 </a:solidFill>
-                <a:miter lim="800000"/>
-                <a:headEnd/>
-                <a:tailEnd/>
-              </a14:hiddenLine>
-            </a:ext>
-            <a:ext uri="{AF507438-7753-43E0-B8FC-AC1667EBCBE1}">
-              <a14:hiddenEffects xmlns:a14="http://schemas.microsoft.com/office/drawing/2010/main">
-                <a:effectLst>
-                  <a:outerShdw dist="35921" dir="2700000" algn="ctr" rotWithShape="0">
-                    <a:schemeClr val="bg2"/>
-                  </a:outerShdw>
-                </a:effectLst>
-              </a14:hiddenEffects>
-            </a:ext>
-          </a:extLst>
-        </p:spPr>
-        <p:txBody>
-          <a:bodyPr vert="horz" wrap="square" lIns="91440" tIns="45720" rIns="91440" bIns="45720" numCol="1" anchor="ctr" anchorCtr="0" compatLnSpc="1">
-            <a:prstTxWarp prst="textNoShape">
-              <a:avLst/>
-            </a:prstTxWarp>
-            <a:spAutoFit/>
-          </a:bodyPr>
-          <a:lstStyle/>
+                <a:effectLst/>
+                <a:ea typeface="Calibri" pitchFamily="34" charset="0"/>
+                <a:cs typeface="Times New Roman" pitchFamily="18" charset="0"/>
+              </a:rPr>
+              <a:t>.</a:t>
+            </a:r>
+          </a:p>
           <a:p>
             <a:pPr marL="0" marR="0" lvl="0" indent="0" algn="l" defTabSz="914400" rtl="0" eaLnBrk="0" fontAlgn="base" latinLnBrk="0" hangingPunct="0">
               <a:lnSpc>
@@ -5922,6 +5882,94 @@
               <a:buNone/>
               <a:tabLst/>
             </a:pPr>
+            <a:endParaRPr kumimoji="0" lang="fr-FR" altLang="fr-FR" b="0" i="0" u="none" strike="noStrike" cap="none" normalizeH="0" baseline="0" dirty="0" smtClean="0">
+              <a:ln>
+                <a:noFill/>
+              </a:ln>
+              <a:solidFill>
+                <a:schemeClr val="tx1"/>
+              </a:solidFill>
+              <a:effectLst/>
+              <a:cs typeface="Arial" pitchFamily="34" charset="0"/>
+            </a:endParaRPr>
+          </a:p>
+        </p:txBody>
+      </p:sp>
+      <p:sp>
+        <p:nvSpPr>
+          <p:cNvPr id="11" name="Rectangle 5"/>
+          <p:cNvSpPr>
+            <a:spLocks noChangeArrowheads="1"/>
+          </p:cNvSpPr>
+          <p:nvPr/>
+        </p:nvSpPr>
+        <p:spPr bwMode="auto">
+          <a:xfrm>
+            <a:off x="3645024" y="7127121"/>
+            <a:ext cx="2910457" cy="1754326"/>
+          </a:xfrm>
+          <a:prstGeom prst="rect">
+            <a:avLst/>
+          </a:prstGeom>
+          <a:noFill/>
+          <a:ln>
+            <a:noFill/>
+          </a:ln>
+          <a:effectLst/>
+          <a:extLst>
+            <a:ext uri="{909E8E84-426E-40DD-AFC4-6F175D3DCCD1}">
+              <a14:hiddenFill xmlns:a14="http://schemas.microsoft.com/office/drawing/2010/main">
+                <a:solidFill>
+                  <a:schemeClr val="accent1"/>
+                </a:solidFill>
+              </a14:hiddenFill>
+            </a:ext>
+            <a:ext uri="{91240B29-F687-4F45-9708-019B960494DF}">
+              <a14:hiddenLine xmlns:a14="http://schemas.microsoft.com/office/drawing/2010/main" w="9525">
+                <a:solidFill>
+                  <a:schemeClr val="tx1"/>
+                </a:solidFill>
+                <a:miter lim="800000"/>
+                <a:headEnd/>
+                <a:tailEnd/>
+              </a14:hiddenLine>
+            </a:ext>
+            <a:ext uri="{AF507438-7753-43E0-B8FC-AC1667EBCBE1}">
+              <a14:hiddenEffects xmlns:a14="http://schemas.microsoft.com/office/drawing/2010/main">
+                <a:effectLst>
+                  <a:outerShdw dist="35921" dir="2700000" algn="ctr" rotWithShape="0">
+                    <a:schemeClr val="bg2"/>
+                  </a:outerShdw>
+                </a:effectLst>
+              </a14:hiddenEffects>
+            </a:ext>
+          </a:extLst>
+        </p:spPr>
+        <p:txBody>
+          <a:bodyPr vert="horz" wrap="square" lIns="91440" tIns="45720" rIns="91440" bIns="45720" numCol="1" anchor="ctr" anchorCtr="0" compatLnSpc="1">
+            <a:prstTxWarp prst="textNoShape">
+              <a:avLst/>
+            </a:prstTxWarp>
+            <a:spAutoFit/>
+          </a:bodyPr>
+          <a:lstStyle/>
+          <a:p>
+            <a:pPr marL="0" marR="0" lvl="0" indent="0" algn="l" defTabSz="914400" rtl="0" eaLnBrk="0" fontAlgn="base" latinLnBrk="0" hangingPunct="0">
+              <a:lnSpc>
+                <a:spcPct val="100000"/>
+              </a:lnSpc>
+              <a:spcBef>
+                <a:spcPct val="0"/>
+              </a:spcBef>
+              <a:spcAft>
+                <a:spcPct val="0"/>
+              </a:spcAft>
+              <a:buClrTx/>
+              <a:buSzTx/>
+              <a:buFontTx/>
+              <a:buNone/>
+              <a:tabLst/>
+            </a:pPr>
             <a:r>
               <a:rPr kumimoji="0" lang="fr-FR" altLang="fr-FR" b="0" i="0" u="none" strike="noStrike" cap="none" normalizeH="0" baseline="0" dirty="0" smtClean="0">
                 <a:ln>
@@ -5934,7 +5982,63 @@
                 <a:ea typeface="Calibri" pitchFamily="34" charset="0"/>
                 <a:cs typeface="Times New Roman" pitchFamily="18" charset="0"/>
               </a:rPr>
-              <a:t>Une fois cela fait, vous n’avez plus qu’à retourner à la page de connexion en cliquant sur </a:t>
+              <a:t>Une fois cela fait, vous n’avez plus qu’à </a:t>
+            </a:r>
+            <a:r>
+              <a:rPr kumimoji="0" lang="fr-FR" altLang="fr-FR" b="0" i="0" u="none" strike="noStrike" cap="none" normalizeH="0" baseline="0" dirty="0" smtClean="0">
+                <a:ln>
+                  <a:noFill/>
+                </a:ln>
+                <a:solidFill>
+                  <a:schemeClr val="tx1"/>
+                </a:solidFill>
+                <a:effectLst/>
+                <a:ea typeface="Calibri" pitchFamily="34" charset="0"/>
+                <a:cs typeface="Times New Roman" pitchFamily="18" charset="0"/>
+              </a:rPr>
+              <a:t>vous connecter.</a:t>
+            </a:r>
+            <a:r>
+              <a:rPr kumimoji="0" lang="fr-FR" altLang="fr-FR" b="0" i="0" u="none" strike="noStrike" cap="none" normalizeH="0" dirty="0" smtClean="0">
+                <a:ln>
+                  <a:noFill/>
+                </a:ln>
+                <a:solidFill>
+                  <a:schemeClr val="tx1"/>
+                </a:solidFill>
+                <a:effectLst/>
+                <a:ea typeface="Calibri" pitchFamily="34" charset="0"/>
+                <a:cs typeface="Times New Roman" pitchFamily="18" charset="0"/>
+              </a:rPr>
+              <a:t> Vous pouvez retourner à l’écran de connexion</a:t>
+            </a:r>
+            <a:r>
+              <a:rPr kumimoji="0" lang="fr-FR" altLang="fr-FR" b="0" i="0" u="none" strike="noStrike" cap="none" normalizeH="0" baseline="0" dirty="0" smtClean="0">
+                <a:ln>
+                  <a:noFill/>
+                </a:ln>
+                <a:solidFill>
+                  <a:schemeClr val="tx1"/>
+                </a:solidFill>
+                <a:effectLst/>
+                <a:ea typeface="Calibri" pitchFamily="34" charset="0"/>
+                <a:cs typeface="Times New Roman" pitchFamily="18" charset="0"/>
+              </a:rPr>
+              <a:t> </a:t>
+            </a:r>
+            <a:r>
+              <a:rPr kumimoji="0" lang="fr-FR" altLang="fr-FR" b="0" i="0" u="none" strike="noStrike" cap="none" normalizeH="0" baseline="0" dirty="0" smtClean="0">
+                <a:ln>
+                  <a:noFill/>
+                </a:ln>
+                <a:solidFill>
+                  <a:schemeClr val="tx1"/>
+                </a:solidFill>
+                <a:effectLst/>
+                <a:ea typeface="Calibri" pitchFamily="34" charset="0"/>
+                <a:cs typeface="Times New Roman" pitchFamily="18" charset="0"/>
+              </a:rPr>
+              <a:t>en cliquant sur </a:t>
             </a:r>
             <a:r>
               <a:rPr kumimoji="0" lang="fr-FR" altLang="fr-FR" b="1" i="0" u="none" strike="noStrike" cap="none" normalizeH="0" baseline="0" dirty="0" smtClean="0">
@@ -7193,11 +7297,7 @@
           <a:p>
             <a:r>
               <a:rPr lang="fr-FR" sz="2800" dirty="0" smtClean="0"/>
-              <a:t>II / </a:t>
-            </a:r>
-            <a:r>
-              <a:rPr lang="fr-FR" sz="2800" dirty="0" smtClean="0"/>
-              <a:t>Utilisateur</a:t>
+              <a:t>II / Utilisateur</a:t>
             </a:r>
             <a:endParaRPr lang="fr-FR" sz="2800" dirty="0"/>
           </a:p>
@@ -7435,7 +7535,7 @@
         <p:spPr>
           <a:xfrm>
             <a:off x="3653195" y="2496542"/>
-            <a:ext cx="3204805" cy="923330"/>
+            <a:ext cx="3204805" cy="1200329"/>
           </a:xfrm>
           <a:prstGeom prst="rect">
             <a:avLst/>
@@ -7450,7 +7550,35 @@
           <a:p>
             <a:r>
               <a:rPr lang="fr-FR" dirty="0" smtClean="0"/>
-              <a:t>Les crédits sont l’ensemble de l’équipe qui a contribué à la réalisation de l’application.</a:t>
+              <a:t>Les crédits </a:t>
+            </a:r>
+            <a:r>
+              <a:rPr lang="fr-FR" dirty="0" smtClean="0"/>
+              <a:t>regroupent</a:t>
+            </a:r>
+            <a:r>
+              <a:rPr lang="fr-FR" dirty="0" smtClean="0"/>
+              <a:t> </a:t>
+            </a:r>
+            <a:r>
+              <a:rPr lang="fr-FR" dirty="0" smtClean="0"/>
+              <a:t>l’ensemble </a:t>
+            </a:r>
+            <a:r>
+              <a:rPr lang="fr-FR" dirty="0" smtClean="0"/>
+              <a:t>des membres de </a:t>
+            </a:r>
+            <a:r>
+              <a:rPr lang="fr-FR" dirty="0" smtClean="0"/>
+              <a:t>l’équipe qui </a:t>
+            </a:r>
+            <a:r>
+              <a:rPr lang="fr-FR" dirty="0" smtClean="0"/>
+              <a:t>ont </a:t>
+            </a:r>
+            <a:r>
+              <a:rPr lang="fr-FR" dirty="0" smtClean="0"/>
+              <a:t>contribué à la réalisation de l’application.</a:t>
             </a:r>
           </a:p>
         </p:txBody>
@@ -7550,11 +7678,7 @@
           <a:p>
             <a:r>
               <a:rPr lang="fr-FR" sz="2800" dirty="0" smtClean="0"/>
-              <a:t>II / </a:t>
-            </a:r>
-            <a:r>
-              <a:rPr lang="fr-FR" sz="2800" dirty="0" smtClean="0"/>
-              <a:t>Utilisateur</a:t>
+              <a:t>II / Utilisateur</a:t>
             </a:r>
             <a:endParaRPr lang="fr-FR" sz="2800" dirty="0"/>
           </a:p>
@@ -8083,7 +8207,6 @@
               <a:rPr lang="fr-FR" sz="1700" dirty="0" smtClean="0"/>
               <a:t>Quand vous commencer la partie, vous avez le temps imparti pour répondre au questions et valider le quiz.</a:t>
             </a:r>
-            <a:endParaRPr lang="fr-FR" sz="1700" dirty="0" smtClean="0"/>
           </a:p>
           <a:p>
             <a:r>
@@ -8096,11 +8219,7 @@
             </a:r>
             <a:r>
               <a:rPr lang="fr-FR" sz="1700" dirty="0" smtClean="0"/>
-              <a:t> : </a:t>
-            </a:r>
-            <a:r>
-              <a:rPr lang="fr-FR" sz="1700" dirty="0" smtClean="0"/>
-              <a:t>changer de questions comme vous voulez. Si le cadre est vert c’est que vous avez répondu sinon il est gris. Le bleu signifie que vous ne</a:t>
+              <a:t> : changer de questions comme vous voulez. Si le cadre est vert c’est que vous avez répondu sinon il est gris. Le bleu signifie que vous ne</a:t>
             </a:r>
             <a:endParaRPr lang="fr-FR" sz="1700" dirty="0"/>
           </a:p>
@@ -8130,11 +8249,7 @@
           <a:p>
             <a:r>
               <a:rPr lang="fr-FR" sz="2800" dirty="0" smtClean="0"/>
-              <a:t>III </a:t>
-            </a:r>
-            <a:r>
-              <a:rPr lang="fr-FR" sz="2800" dirty="0" smtClean="0"/>
-              <a:t>/ Jouer une partie</a:t>
+              <a:t>III / Jouer une partie</a:t>
             </a:r>
             <a:endParaRPr lang="fr-FR" sz="2800" dirty="0"/>
           </a:p>
@@ -9040,8 +9155,13 @@
           <a:p>
             <a:r>
               <a:rPr lang="fr-FR" sz="1700" dirty="0"/>
-              <a:t>l’avez pas consulté.</a:t>
-            </a:r>
+              <a:t>l’avez pas consulté</a:t>
+            </a:r>
+            <a:r>
+              <a:rPr lang="fr-FR" sz="1700" dirty="0" smtClean="0"/>
+              <a:t>. Le orange indique à quelle question vous êtes.</a:t>
+            </a:r>
+            <a:endParaRPr lang="fr-FR" sz="1700" dirty="0"/>
           </a:p>
           <a:p>
             <a:r>
@@ -9134,7 +9254,7 @@
       </p:grpSpPr>
       <p:pic>
         <p:nvPicPr>
-          <p:cNvPr id="4" name="Image 3" descr="Temps Ã©coulÃ© !"/>
+          <p:cNvPr id="4" name="Image 3"/>
           <p:cNvPicPr>
             <a:picLocks noChangeAspect="1"/>
           </p:cNvPicPr>
@@ -9154,8 +9274,8 @@
         </p:blipFill>
         <p:spPr>
           <a:xfrm>
-            <a:off x="2545094" y="3262197"/>
-            <a:ext cx="1906830" cy="792275"/>
+            <a:off x="2567441" y="3262197"/>
+            <a:ext cx="1862136" cy="792275"/>
           </a:xfrm>
           <a:prstGeom prst="rect">
             <a:avLst/>
@@ -9269,7 +9389,7 @@
       </p:sp>
       <p:pic>
         <p:nvPicPr>
-          <p:cNvPr id="6" name="Image 5" descr="(&gt; o _ o )&gt;          --[__W  A  R___Q  U  I  Z__]--          &lt;[ x _ x &lt;]"/>
+          <p:cNvPr id="6" name="Image 5"/>
           <p:cNvPicPr>
             <a:picLocks noChangeAspect="1"/>
           </p:cNvPicPr>
@@ -9289,8 +9409,8 @@
         </p:blipFill>
         <p:spPr>
           <a:xfrm>
-            <a:off x="547200" y="5554800"/>
-            <a:ext cx="3107079" cy="2401200"/>
+            <a:off x="553927" y="5554800"/>
+            <a:ext cx="3093624" cy="2401200"/>
           </a:xfrm>
           <a:prstGeom prst="rect">
             <a:avLst/>
@@ -9335,7 +9455,7 @@
         </p:nvSpPr>
         <p:spPr>
           <a:xfrm>
-            <a:off x="3106800" y="7128000"/>
+            <a:off x="3116386" y="7292860"/>
             <a:ext cx="396000" cy="126000"/>
           </a:xfrm>
           <a:prstGeom prst="rect">
@@ -9381,7 +9501,7 @@
         </p:nvSpPr>
         <p:spPr>
           <a:xfrm>
-            <a:off x="1987200" y="5796000"/>
+            <a:off x="1967552" y="5826980"/>
             <a:ext cx="1238400" cy="86400"/>
           </a:xfrm>
           <a:prstGeom prst="rect">
@@ -9427,8 +9547,8 @@
         </p:nvSpPr>
         <p:spPr>
           <a:xfrm>
-            <a:off x="620688" y="6516216"/>
-            <a:ext cx="1656184" cy="1368152"/>
+            <a:off x="620688" y="6540979"/>
+            <a:ext cx="1656184" cy="1271381"/>
           </a:xfrm>
           <a:prstGeom prst="rect">
             <a:avLst/>
@@ -9511,7 +9631,7 @@
         </p:nvSpPr>
         <p:spPr>
           <a:xfrm>
-            <a:off x="3240692" y="5708395"/>
+            <a:off x="3185985" y="5743452"/>
             <a:ext cx="256802" cy="261610"/>
           </a:xfrm>
           <a:prstGeom prst="rect">
@@ -9549,7 +9669,7 @@
         </p:nvSpPr>
         <p:spPr>
           <a:xfrm>
-            <a:off x="2849998" y="7069487"/>
+            <a:off x="2859584" y="7225055"/>
             <a:ext cx="256802" cy="261610"/>
           </a:xfrm>
           <a:prstGeom prst="rect">
@@ -10228,11 +10348,7 @@
           <a:p>
             <a:r>
               <a:rPr lang="fr-FR" sz="2800" dirty="0" smtClean="0"/>
-              <a:t>IV </a:t>
-            </a:r>
-            <a:r>
-              <a:rPr lang="fr-FR" sz="2800" dirty="0" smtClean="0"/>
-              <a:t>/ Administrateur</a:t>
+              <a:t>IV / Administrateur</a:t>
             </a:r>
             <a:endParaRPr lang="fr-FR" sz="2800" dirty="0"/>
           </a:p>
@@ -10960,11 +11076,7 @@
           <a:p>
             <a:r>
               <a:rPr lang="fr-FR" sz="2800" dirty="0" smtClean="0"/>
-              <a:t>IV </a:t>
-            </a:r>
-            <a:r>
-              <a:rPr lang="fr-FR" sz="2800" dirty="0" smtClean="0"/>
-              <a:t>/ Administrateur</a:t>
+              <a:t>IV / Administrateur</a:t>
             </a:r>
             <a:endParaRPr lang="fr-FR" sz="2800" dirty="0"/>
           </a:p>
@@ -11687,11 +11799,7 @@
           <a:p>
             <a:r>
               <a:rPr lang="fr-FR" sz="2800" dirty="0" smtClean="0"/>
-              <a:t>IV </a:t>
-            </a:r>
-            <a:r>
-              <a:rPr lang="fr-FR" sz="2800" dirty="0" smtClean="0"/>
-              <a:t>/ Administrateur</a:t>
+              <a:t>IV / Administrateur</a:t>
             </a:r>
             <a:endParaRPr lang="fr-FR" sz="2800" dirty="0"/>
           </a:p>
@@ -11961,7 +12069,11 @@
             </a:r>
             <a:r>
               <a:rPr lang="fr-FR" dirty="0" smtClean="0"/>
-              <a:t>. Une fenêtre vous demandera d’entrer votre question </a:t>
+              <a:t>. </a:t>
+            </a:r>
+            <a:r>
+              <a:rPr lang="fr-FR" dirty="0" smtClean="0"/>
+              <a:t>Une fenêtre vous demandera d’entrer votre question </a:t>
             </a:r>
             <a:r>
               <a:rPr lang="fr-FR" dirty="0" smtClean="0">
@@ -11975,6 +12087,7 @@
               <a:rPr lang="fr-FR" dirty="0" smtClean="0"/>
               <a:t>.</a:t>
             </a:r>
+            <a:endParaRPr lang="fr-FR" dirty="0" smtClean="0"/>
           </a:p>
           <a:p>
             <a:r>
@@ -12142,7 +12255,7 @@
         </p:blipFill>
         <p:spPr>
           <a:xfrm>
-            <a:off x="561599" y="5580112"/>
+            <a:off x="561600" y="5573271"/>
             <a:ext cx="3091595" cy="2389232"/>
           </a:xfrm>
           <a:prstGeom prst="rect">
@@ -12351,7 +12464,7 @@
         </p:nvSpPr>
         <p:spPr>
           <a:xfrm>
-            <a:off x="1042638" y="6772418"/>
+            <a:off x="3125295" y="6930352"/>
             <a:ext cx="256802" cy="261610"/>
           </a:xfrm>
           <a:prstGeom prst="rect">
@@ -12389,7 +12502,7 @@
         </p:nvSpPr>
         <p:spPr>
           <a:xfrm>
-            <a:off x="2674985" y="6772418"/>
+            <a:off x="915536" y="6759226"/>
             <a:ext cx="256802" cy="261610"/>
           </a:xfrm>
           <a:prstGeom prst="rect">
@@ -12511,7 +12624,7 @@
         </p:nvSpPr>
         <p:spPr>
           <a:xfrm>
-            <a:off x="2185950" y="2838349"/>
+            <a:off x="3006154" y="3297332"/>
             <a:ext cx="256802" cy="261610"/>
           </a:xfrm>
           <a:prstGeom prst="rect">
@@ -12549,7 +12662,7 @@
         </p:nvSpPr>
         <p:spPr>
           <a:xfrm>
-            <a:off x="3061263" y="3302206"/>
+            <a:off x="2226711" y="2870694"/>
             <a:ext cx="256802" cy="261610"/>
           </a:xfrm>
           <a:prstGeom prst="rect">

</xml_diff>

<commit_message>
Des bug corrigé en post rendu .... pas mal non ?
</commit_message>
<xml_diff>
--- a/Docs/manuel utilisateur WQ.pptx
+++ b/Docs/manuel utilisateur WQ.pptx
@@ -5299,8 +5299,8 @@
         </p:nvSpPr>
         <p:spPr>
           <a:xfrm>
-            <a:off x="2119585" y="5148064"/>
-            <a:ext cx="4045719" cy="923330"/>
+            <a:off x="1932102" y="5148064"/>
+            <a:ext cx="3153082" cy="923330"/>
           </a:xfrm>
           <a:prstGeom prst="rect">
             <a:avLst/>
@@ -5502,6 +5502,36 @@
           </a:extLst>
         </p:spPr>
       </p:pic>
+      <p:sp>
+        <p:nvSpPr>
+          <p:cNvPr id="5" name="ZoneTexte 4"/>
+          <p:cNvSpPr txBox="1"/>
+          <p:nvPr/>
+        </p:nvSpPr>
+        <p:spPr>
+          <a:xfrm>
+            <a:off x="1941049" y="5796136"/>
+            <a:ext cx="2856103" cy="523220"/>
+          </a:xfrm>
+          <a:prstGeom prst="rect">
+            <a:avLst/>
+          </a:prstGeom>
+          <a:noFill/>
+        </p:spPr>
+        <p:txBody>
+          <a:bodyPr wrap="none" rtlCol="0">
+            <a:spAutoFit/>
+          </a:bodyPr>
+          <a:lstStyle/>
+          <a:p>
+            <a:r>
+              <a:rPr lang="fr-FR" sz="2800" dirty="0" smtClean="0"/>
+              <a:t>Manuel utilisateur</a:t>
+            </a:r>
+            <a:endParaRPr lang="fr-FR" sz="2800" dirty="0"/>
+          </a:p>
+        </p:txBody>
+      </p:sp>
     </p:spTree>
     <p:extLst>
       <p:ext uri="{BB962C8B-B14F-4D97-AF65-F5344CB8AC3E}">

</xml_diff>